<commit_message>
many many changes. Sorry about that.
</commit_message>
<xml_diff>
--- a/99_assets/course_review_lead.pptx
+++ b/99_assets/course_review_lead.pptx
@@ -4922,6 +4922,225 @@
       </pc:sldChg>
     </pc:docChg>
   </pc:docChgLst>
+  <pc:docChgLst>
+    <pc:chgData name="Philippe Baucour" userId="5102170ae7533958" providerId="LiveId" clId="{3D4C44F0-3587-4D74-B28A-472E799DF1DE}"/>
+    <pc:docChg chg="undo custSel modSld">
+      <pc:chgData name="Philippe Baucour" userId="5102170ae7533958" providerId="LiveId" clId="{3D4C44F0-3587-4D74-B28A-472E799DF1DE}" dt="2024-07-31T08:19:52.960" v="230" actId="6549"/>
+      <pc:docMkLst>
+        <pc:docMk/>
+      </pc:docMkLst>
+      <pc:sldChg chg="modSp mod">
+        <pc:chgData name="Philippe Baucour" userId="5102170ae7533958" providerId="LiveId" clId="{3D4C44F0-3587-4D74-B28A-472E799DF1DE}" dt="2024-07-31T08:15:01.169" v="193" actId="20577"/>
+        <pc:sldMkLst>
+          <pc:docMk/>
+          <pc:sldMk cId="362046842" sldId="300"/>
+        </pc:sldMkLst>
+        <pc:spChg chg="mod">
+          <ac:chgData name="Philippe Baucour" userId="5102170ae7533958" providerId="LiveId" clId="{3D4C44F0-3587-4D74-B28A-472E799DF1DE}" dt="2024-07-31T08:15:01.169" v="193" actId="20577"/>
+          <ac:spMkLst>
+            <pc:docMk/>
+            <pc:sldMk cId="362046842" sldId="300"/>
+            <ac:spMk id="3" creationId="{5601433B-C412-9FA5-9E08-9B563ECD92CE}"/>
+          </ac:spMkLst>
+        </pc:spChg>
+      </pc:sldChg>
+      <pc:sldChg chg="modSp mod">
+        <pc:chgData name="Philippe Baucour" userId="5102170ae7533958" providerId="LiveId" clId="{3D4C44F0-3587-4D74-B28A-472E799DF1DE}" dt="2024-07-31T08:15:10.132" v="194"/>
+        <pc:sldMkLst>
+          <pc:docMk/>
+          <pc:sldMk cId="500769337" sldId="301"/>
+        </pc:sldMkLst>
+        <pc:spChg chg="mod">
+          <ac:chgData name="Philippe Baucour" userId="5102170ae7533958" providerId="LiveId" clId="{3D4C44F0-3587-4D74-B28A-472E799DF1DE}" dt="2024-07-31T08:15:10.132" v="194"/>
+          <ac:spMkLst>
+            <pc:docMk/>
+            <pc:sldMk cId="500769337" sldId="301"/>
+            <ac:spMk id="2" creationId="{41E70075-38F3-43A1-8D28-1A02FD52EC59}"/>
+          </ac:spMkLst>
+        </pc:spChg>
+      </pc:sldChg>
+      <pc:sldChg chg="modSp mod">
+        <pc:chgData name="Philippe Baucour" userId="5102170ae7533958" providerId="LiveId" clId="{3D4C44F0-3587-4D74-B28A-472E799DF1DE}" dt="2024-07-31T08:15:14.356" v="195"/>
+        <pc:sldMkLst>
+          <pc:docMk/>
+          <pc:sldMk cId="303212812" sldId="302"/>
+        </pc:sldMkLst>
+        <pc:spChg chg="mod">
+          <ac:chgData name="Philippe Baucour" userId="5102170ae7533958" providerId="LiveId" clId="{3D4C44F0-3587-4D74-B28A-472E799DF1DE}" dt="2024-07-31T08:15:14.356" v="195"/>
+          <ac:spMkLst>
+            <pc:docMk/>
+            <pc:sldMk cId="303212812" sldId="302"/>
+            <ac:spMk id="2" creationId="{D0DBB2EA-4239-B0FD-F2FB-69EFCC9BBE97}"/>
+          </ac:spMkLst>
+        </pc:spChg>
+      </pc:sldChg>
+      <pc:sldChg chg="modSp mod">
+        <pc:chgData name="Philippe Baucour" userId="5102170ae7533958" providerId="LiveId" clId="{3D4C44F0-3587-4D74-B28A-472E799DF1DE}" dt="2024-07-31T08:18:52.688" v="217" actId="6549"/>
+        <pc:sldMkLst>
+          <pc:docMk/>
+          <pc:sldMk cId="2108947754" sldId="303"/>
+        </pc:sldMkLst>
+        <pc:spChg chg="mod">
+          <ac:chgData name="Philippe Baucour" userId="5102170ae7533958" providerId="LiveId" clId="{3D4C44F0-3587-4D74-B28A-472E799DF1DE}" dt="2024-07-31T08:18:52.688" v="217" actId="6549"/>
+          <ac:spMkLst>
+            <pc:docMk/>
+            <pc:sldMk cId="2108947754" sldId="303"/>
+            <ac:spMk id="2" creationId="{E8A06978-3522-205D-E12B-5B6C00F6EA17}"/>
+          </ac:spMkLst>
+        </pc:spChg>
+      </pc:sldChg>
+      <pc:sldChg chg="modSp mod">
+        <pc:chgData name="Philippe Baucour" userId="5102170ae7533958" providerId="LiveId" clId="{3D4C44F0-3587-4D74-B28A-472E799DF1DE}" dt="2024-07-31T08:19:52.960" v="230" actId="6549"/>
+        <pc:sldMkLst>
+          <pc:docMk/>
+          <pc:sldMk cId="771183398" sldId="304"/>
+        </pc:sldMkLst>
+        <pc:spChg chg="mod">
+          <ac:chgData name="Philippe Baucour" userId="5102170ae7533958" providerId="LiveId" clId="{3D4C44F0-3587-4D74-B28A-472E799DF1DE}" dt="2024-07-31T08:19:52.960" v="230" actId="6549"/>
+          <ac:spMkLst>
+            <pc:docMk/>
+            <pc:sldMk cId="771183398" sldId="304"/>
+            <ac:spMk id="2" creationId="{D276AEF9-7CB4-DBF9-7004-121C3F76A9A1}"/>
+          </ac:spMkLst>
+        </pc:spChg>
+      </pc:sldChg>
+      <pc:sldChg chg="modSp mod">
+        <pc:chgData name="Philippe Baucour" userId="5102170ae7533958" providerId="LiveId" clId="{3D4C44F0-3587-4D74-B28A-472E799DF1DE}" dt="2024-07-31T08:08:31.706" v="121" actId="20577"/>
+        <pc:sldMkLst>
+          <pc:docMk/>
+          <pc:sldMk cId="3562747711" sldId="305"/>
+        </pc:sldMkLst>
+        <pc:spChg chg="mod">
+          <ac:chgData name="Philippe Baucour" userId="5102170ae7533958" providerId="LiveId" clId="{3D4C44F0-3587-4D74-B28A-472E799DF1DE}" dt="2024-07-31T08:08:31.706" v="121" actId="20577"/>
+          <ac:spMkLst>
+            <pc:docMk/>
+            <pc:sldMk cId="3562747711" sldId="305"/>
+            <ac:spMk id="2" creationId="{7C4A0E59-A037-BF7A-4FAA-1F12C6070D56}"/>
+          </ac:spMkLst>
+        </pc:spChg>
+      </pc:sldChg>
+      <pc:sldChg chg="modSp mod">
+        <pc:chgData name="Philippe Baucour" userId="5102170ae7533958" providerId="LiveId" clId="{3D4C44F0-3587-4D74-B28A-472E799DF1DE}" dt="2024-07-31T08:10:25.576" v="138" actId="5793"/>
+        <pc:sldMkLst>
+          <pc:docMk/>
+          <pc:sldMk cId="745580438" sldId="306"/>
+        </pc:sldMkLst>
+        <pc:spChg chg="mod">
+          <ac:chgData name="Philippe Baucour" userId="5102170ae7533958" providerId="LiveId" clId="{3D4C44F0-3587-4D74-B28A-472E799DF1DE}" dt="2024-07-31T08:10:25.576" v="138" actId="5793"/>
+          <ac:spMkLst>
+            <pc:docMk/>
+            <pc:sldMk cId="745580438" sldId="306"/>
+            <ac:spMk id="2" creationId="{C51B3963-F913-FAD7-2B5C-C6231E0FB7E0}"/>
+          </ac:spMkLst>
+        </pc:spChg>
+      </pc:sldChg>
+      <pc:sldChg chg="modSp mod">
+        <pc:chgData name="Philippe Baucour" userId="5102170ae7533958" providerId="LiveId" clId="{3D4C44F0-3587-4D74-B28A-472E799DF1DE}" dt="2024-07-31T08:12:32.809" v="166"/>
+        <pc:sldMkLst>
+          <pc:docMk/>
+          <pc:sldMk cId="2969746590" sldId="307"/>
+        </pc:sldMkLst>
+        <pc:spChg chg="mod">
+          <ac:chgData name="Philippe Baucour" userId="5102170ae7533958" providerId="LiveId" clId="{3D4C44F0-3587-4D74-B28A-472E799DF1DE}" dt="2024-07-31T08:12:32.809" v="166"/>
+          <ac:spMkLst>
+            <pc:docMk/>
+            <pc:sldMk cId="2969746590" sldId="307"/>
+            <ac:spMk id="2" creationId="{C1B6D8F8-9417-E8BB-4C0C-20F495209F6E}"/>
+          </ac:spMkLst>
+        </pc:spChg>
+      </pc:sldChg>
+      <pc:sldChg chg="modSp mod">
+        <pc:chgData name="Philippe Baucour" userId="5102170ae7533958" providerId="LiveId" clId="{3D4C44F0-3587-4D74-B28A-472E799DF1DE}" dt="2024-07-31T08:12:28.375" v="165"/>
+        <pc:sldMkLst>
+          <pc:docMk/>
+          <pc:sldMk cId="1431826525" sldId="308"/>
+        </pc:sldMkLst>
+        <pc:spChg chg="mod">
+          <ac:chgData name="Philippe Baucour" userId="5102170ae7533958" providerId="LiveId" clId="{3D4C44F0-3587-4D74-B28A-472E799DF1DE}" dt="2024-07-31T08:12:28.375" v="165"/>
+          <ac:spMkLst>
+            <pc:docMk/>
+            <pc:sldMk cId="1431826525" sldId="308"/>
+            <ac:spMk id="2" creationId="{D5199EB7-41C4-D2EB-9D79-85C93A241BD6}"/>
+          </ac:spMkLst>
+        </pc:spChg>
+      </pc:sldChg>
+      <pc:sldChg chg="modSp mod">
+        <pc:chgData name="Philippe Baucour" userId="5102170ae7533958" providerId="LiveId" clId="{3D4C44F0-3587-4D74-B28A-472E799DF1DE}" dt="2024-07-31T08:12:21.441" v="164" actId="20577"/>
+        <pc:sldMkLst>
+          <pc:docMk/>
+          <pc:sldMk cId="3873636325" sldId="309"/>
+        </pc:sldMkLst>
+        <pc:spChg chg="mod">
+          <ac:chgData name="Philippe Baucour" userId="5102170ae7533958" providerId="LiveId" clId="{3D4C44F0-3587-4D74-B28A-472E799DF1DE}" dt="2024-07-31T08:12:21.441" v="164" actId="20577"/>
+          <ac:spMkLst>
+            <pc:docMk/>
+            <pc:sldMk cId="3873636325" sldId="309"/>
+            <ac:spMk id="2" creationId="{78B511FD-690B-7F4D-72CE-17E648F3C616}"/>
+          </ac:spMkLst>
+        </pc:spChg>
+      </pc:sldChg>
+      <pc:sldChg chg="modSp mod">
+        <pc:chgData name="Philippe Baucour" userId="5102170ae7533958" providerId="LiveId" clId="{3D4C44F0-3587-4D74-B28A-472E799DF1DE}" dt="2024-07-31T08:13:19.276" v="169" actId="20577"/>
+        <pc:sldMkLst>
+          <pc:docMk/>
+          <pc:sldMk cId="1431707760" sldId="310"/>
+        </pc:sldMkLst>
+        <pc:spChg chg="mod">
+          <ac:chgData name="Philippe Baucour" userId="5102170ae7533958" providerId="LiveId" clId="{3D4C44F0-3587-4D74-B28A-472E799DF1DE}" dt="2024-07-31T08:13:19.276" v="169" actId="20577"/>
+          <ac:spMkLst>
+            <pc:docMk/>
+            <pc:sldMk cId="1431707760" sldId="310"/>
+            <ac:spMk id="2" creationId="{B1E353B6-D1CE-BD2B-6680-CB4584D2A1BF}"/>
+          </ac:spMkLst>
+        </pc:spChg>
+      </pc:sldChg>
+      <pc:sldChg chg="modSp mod">
+        <pc:chgData name="Philippe Baucour" userId="5102170ae7533958" providerId="LiveId" clId="{3D4C44F0-3587-4D74-B28A-472E799DF1DE}" dt="2024-07-31T08:13:26.788" v="170"/>
+        <pc:sldMkLst>
+          <pc:docMk/>
+          <pc:sldMk cId="2198928540" sldId="311"/>
+        </pc:sldMkLst>
+        <pc:spChg chg="mod">
+          <ac:chgData name="Philippe Baucour" userId="5102170ae7533958" providerId="LiveId" clId="{3D4C44F0-3587-4D74-B28A-472E799DF1DE}" dt="2024-07-31T08:13:26.788" v="170"/>
+          <ac:spMkLst>
+            <pc:docMk/>
+            <pc:sldMk cId="2198928540" sldId="311"/>
+            <ac:spMk id="2" creationId="{43799BFF-CB87-3CB6-1EB6-02B0DAE1A944}"/>
+          </ac:spMkLst>
+        </pc:spChg>
+      </pc:sldChg>
+      <pc:sldChg chg="modSp mod">
+        <pc:chgData name="Philippe Baucour" userId="5102170ae7533958" providerId="LiveId" clId="{3D4C44F0-3587-4D74-B28A-472E799DF1DE}" dt="2024-07-31T08:13:31.556" v="171"/>
+        <pc:sldMkLst>
+          <pc:docMk/>
+          <pc:sldMk cId="1464288720" sldId="312"/>
+        </pc:sldMkLst>
+        <pc:spChg chg="mod">
+          <ac:chgData name="Philippe Baucour" userId="5102170ae7533958" providerId="LiveId" clId="{3D4C44F0-3587-4D74-B28A-472E799DF1DE}" dt="2024-07-31T08:13:31.556" v="171"/>
+          <ac:spMkLst>
+            <pc:docMk/>
+            <pc:sldMk cId="1464288720" sldId="312"/>
+            <ac:spMk id="2" creationId="{82FC8D52-6560-C416-82DE-265F61F94D90}"/>
+          </ac:spMkLst>
+        </pc:spChg>
+      </pc:sldChg>
+      <pc:sldChg chg="modSp mod">
+        <pc:chgData name="Philippe Baucour" userId="5102170ae7533958" providerId="LiveId" clId="{3D4C44F0-3587-4D74-B28A-472E799DF1DE}" dt="2024-07-31T08:13:51.569" v="187" actId="20577"/>
+        <pc:sldMkLst>
+          <pc:docMk/>
+          <pc:sldMk cId="3280631585" sldId="313"/>
+        </pc:sldMkLst>
+        <pc:spChg chg="mod">
+          <ac:chgData name="Philippe Baucour" userId="5102170ae7533958" providerId="LiveId" clId="{3D4C44F0-3587-4D74-B28A-472E799DF1DE}" dt="2024-07-31T08:13:51.569" v="187" actId="20577"/>
+          <ac:spMkLst>
+            <pc:docMk/>
+            <pc:sldMk cId="3280631585" sldId="313"/>
+            <ac:spMk id="2" creationId="{CAAE943A-FE50-54A3-42EF-263D9F27EFBD}"/>
+          </ac:spMkLst>
+        </pc:spChg>
+      </pc:sldChg>
+    </pc:docChg>
+  </pc:docChgLst>
 </pc:chgInfo>
 </file>
 
@@ -5007,7 +5226,7 @@
           <a:p>
             <a:fld id="{C5D8FFE9-C585-481A-8C95-EA03CD59938B}" type="datetimeFigureOut">
               <a:rPr lang="fr-FR" smtClean="0"/>
-              <a:t>19/06/2024</a:t>
+              <a:t>31/07/2024</a:t>
             </a:fld>
             <a:endParaRPr lang="fr-FR"/>
           </a:p>
@@ -5421,7 +5640,7 @@
           <a:p>
             <a:fld id="{E049BE60-F297-4D51-9BF6-34EA6E4A2150}" type="datetimeFigureOut">
               <a:rPr lang="fr-FR" smtClean="0"/>
-              <a:t>19/06/2024</a:t>
+              <a:t>31/07/2024</a:t>
             </a:fld>
             <a:endParaRPr lang="fr-FR"/>
           </a:p>
@@ -5619,7 +5838,7 @@
           <a:p>
             <a:fld id="{E049BE60-F297-4D51-9BF6-34EA6E4A2150}" type="datetimeFigureOut">
               <a:rPr lang="fr-FR" smtClean="0"/>
-              <a:t>19/06/2024</a:t>
+              <a:t>31/07/2024</a:t>
             </a:fld>
             <a:endParaRPr lang="fr-FR"/>
           </a:p>
@@ -5827,7 +6046,7 @@
           <a:p>
             <a:fld id="{E049BE60-F297-4D51-9BF6-34EA6E4A2150}" type="datetimeFigureOut">
               <a:rPr lang="fr-FR" smtClean="0"/>
-              <a:t>19/06/2024</a:t>
+              <a:t>31/07/2024</a:t>
             </a:fld>
             <a:endParaRPr lang="fr-FR"/>
           </a:p>
@@ -6025,7 +6244,7 @@
           <a:p>
             <a:fld id="{E049BE60-F297-4D51-9BF6-34EA6E4A2150}" type="datetimeFigureOut">
               <a:rPr lang="fr-FR" smtClean="0"/>
-              <a:t>19/06/2024</a:t>
+              <a:t>31/07/2024</a:t>
             </a:fld>
             <a:endParaRPr lang="fr-FR"/>
           </a:p>
@@ -6300,7 +6519,7 @@
           <a:p>
             <a:fld id="{E049BE60-F297-4D51-9BF6-34EA6E4A2150}" type="datetimeFigureOut">
               <a:rPr lang="fr-FR" smtClean="0"/>
-              <a:t>19/06/2024</a:t>
+              <a:t>31/07/2024</a:t>
             </a:fld>
             <a:endParaRPr lang="fr-FR"/>
           </a:p>
@@ -6565,7 +6784,7 @@
           <a:p>
             <a:fld id="{E049BE60-F297-4D51-9BF6-34EA6E4A2150}" type="datetimeFigureOut">
               <a:rPr lang="fr-FR" smtClean="0"/>
-              <a:t>19/06/2024</a:t>
+              <a:t>31/07/2024</a:t>
             </a:fld>
             <a:endParaRPr lang="fr-FR"/>
           </a:p>
@@ -6977,7 +7196,7 @@
           <a:p>
             <a:fld id="{E049BE60-F297-4D51-9BF6-34EA6E4A2150}" type="datetimeFigureOut">
               <a:rPr lang="fr-FR" smtClean="0"/>
-              <a:t>19/06/2024</a:t>
+              <a:t>31/07/2024</a:t>
             </a:fld>
             <a:endParaRPr lang="fr-FR"/>
           </a:p>
@@ -7118,7 +7337,7 @@
           <a:p>
             <a:fld id="{E049BE60-F297-4D51-9BF6-34EA6E4A2150}" type="datetimeFigureOut">
               <a:rPr lang="fr-FR" smtClean="0"/>
-              <a:t>19/06/2024</a:t>
+              <a:t>31/07/2024</a:t>
             </a:fld>
             <a:endParaRPr lang="fr-FR"/>
           </a:p>
@@ -7231,7 +7450,7 @@
           <a:p>
             <a:fld id="{E049BE60-F297-4D51-9BF6-34EA6E4A2150}" type="datetimeFigureOut">
               <a:rPr lang="fr-FR" smtClean="0"/>
-              <a:t>19/06/2024</a:t>
+              <a:t>31/07/2024</a:t>
             </a:fld>
             <a:endParaRPr lang="fr-FR"/>
           </a:p>
@@ -7542,7 +7761,7 @@
           <a:p>
             <a:fld id="{E049BE60-F297-4D51-9BF6-34EA6E4A2150}" type="datetimeFigureOut">
               <a:rPr lang="fr-FR" smtClean="0"/>
-              <a:t>19/06/2024</a:t>
+              <a:t>31/07/2024</a:t>
             </a:fld>
             <a:endParaRPr lang="fr-FR"/>
           </a:p>
@@ -7833,7 +8052,7 @@
           <a:p>
             <a:fld id="{E049BE60-F297-4D51-9BF6-34EA6E4A2150}" type="datetimeFigureOut">
               <a:rPr lang="fr-FR" smtClean="0"/>
-              <a:t>19/06/2024</a:t>
+              <a:t>31/07/2024</a:t>
             </a:fld>
             <a:endParaRPr lang="fr-FR"/>
           </a:p>
@@ -8074,7 +8293,7 @@
           <a:p>
             <a:fld id="{E049BE60-F297-4D51-9BF6-34EA6E4A2150}" type="datetimeFigureOut">
               <a:rPr lang="fr-FR" smtClean="0"/>
-              <a:t>19/06/2024</a:t>
+              <a:t>31/07/2024</a:t>
             </a:fld>
             <a:endParaRPr lang="fr-FR"/>
           </a:p>
@@ -8514,7 +8733,7 @@
           <a:p>
             <a:r>
               <a:rPr lang="fr-FR" dirty="0"/>
-              <a:t>DOCKER</a:t>
+              <a:t>Distributed ML - DOCKER</a:t>
             </a:r>
           </a:p>
         </p:txBody>
@@ -8597,7 +8816,7 @@
           <a:p>
             <a:r>
               <a:rPr lang="fr-FR" dirty="0"/>
-              <a:t>GRAPH</a:t>
+              <a:t>DATA PIPELINE - NEO4J</a:t>
             </a:r>
           </a:p>
         </p:txBody>
@@ -8680,7 +8899,7 @@
           <a:p>
             <a:r>
               <a:rPr lang="fr-FR" dirty="0"/>
-              <a:t>ZAPIER</a:t>
+              <a:t>Automation Workflow - ZAPIER</a:t>
             </a:r>
           </a:p>
         </p:txBody>
@@ -8763,7 +8982,7 @@
           <a:p>
             <a:r>
               <a:rPr lang="fr-FR" dirty="0"/>
-              <a:t>AIRFLOW</a:t>
+              <a:t>Automation Workflow - AIRFLOW</a:t>
             </a:r>
           </a:p>
         </p:txBody>
@@ -8846,7 +9065,7 @@
           <a:p>
             <a:r>
               <a:rPr lang="fr-FR" dirty="0"/>
-              <a:t>ETL &amp; AIRFLOW</a:t>
+              <a:t>Automation Workflow - ETL &amp; AIRFLOW</a:t>
             </a:r>
           </a:p>
         </p:txBody>
@@ -8928,8 +9147,8 @@
           <a:lstStyle/>
           <a:p>
             <a:r>
-              <a:rPr lang="fr-FR"/>
-              <a:t>EVIDENTLY</a:t>
+              <a:rPr lang="fr-FR" dirty="0"/>
+              <a:t>ML Monitoring - EVIDENTLY</a:t>
             </a:r>
           </a:p>
         </p:txBody>
@@ -9012,7 +9231,7 @@
           <a:p>
             <a:r>
               <a:rPr lang="fr-FR" dirty="0"/>
-              <a:t>KUBERNETES</a:t>
+              <a:t>Distributed ML - KUBERNETES</a:t>
             </a:r>
           </a:p>
         </p:txBody>
@@ -9095,7 +9314,7 @@
           <a:p>
             <a:r>
               <a:rPr lang="fr-FR" dirty="0"/>
-              <a:t>HELM</a:t>
+              <a:t>Distributed ML - HELM + K8s Cloud</a:t>
             </a:r>
           </a:p>
         </p:txBody>
@@ -9173,12 +9392,14 @@
         </p:nvSpPr>
         <p:spPr/>
         <p:txBody>
-          <a:bodyPr/>
+          <a:bodyPr>
+            <a:normAutofit/>
+          </a:bodyPr>
           <a:lstStyle/>
           <a:p>
             <a:r>
               <a:rPr lang="fr-FR" dirty="0"/>
-              <a:t>RAY</a:t>
+              <a:t>Distributed ML - RAY Sklearn</a:t>
             </a:r>
           </a:p>
         </p:txBody>
@@ -9260,8 +9481,12 @@
           <a:lstStyle/>
           <a:p>
             <a:r>
+              <a:rPr lang="fr-FR"/>
+              <a:t>Distributed ML – DL &amp; Ray </a:t>
+            </a:r>
+            <a:r>
               <a:rPr lang="fr-FR" dirty="0"/>
-              <a:t>Distributed Deep Learning</a:t>
+              <a:t>Cluster</a:t>
             </a:r>
           </a:p>
         </p:txBody>
@@ -9344,6 +9569,14 @@
           <a:p>
             <a:r>
               <a:rPr lang="fr-FR" dirty="0" err="1"/>
+              <a:t>Reinforcement</a:t>
+            </a:r>
+            <a:r>
+              <a:rPr lang="fr-FR" dirty="0"/>
+              <a:t> Learning - </a:t>
+            </a:r>
+            <a:r>
+              <a:rPr lang="fr-FR" dirty="0" err="1"/>
               <a:t>OpenAI</a:t>
             </a:r>
             <a:r>
@@ -9430,8 +9663,20 @@
           <a:lstStyle/>
           <a:p>
             <a:r>
+              <a:rPr lang="fr-FR" dirty="0"/>
+              <a:t>Deep </a:t>
+            </a:r>
+            <a:r>
               <a:rPr lang="fr-FR" dirty="0" err="1"/>
-              <a:t>RLib</a:t>
+              <a:t>Reinforcement</a:t>
+            </a:r>
+            <a:r>
+              <a:rPr lang="fr-FR" dirty="0"/>
+              <a:t> Learning – Ray </a:t>
+            </a:r>
+            <a:r>
+              <a:rPr lang="fr-FR" dirty="0" err="1"/>
+              <a:t>RLlib</a:t>
             </a:r>
             <a:endParaRPr lang="fr-FR" dirty="0"/>
           </a:p>
@@ -9515,7 +9760,7 @@
           <a:p>
             <a:r>
               <a:rPr lang="fr-FR" dirty="0"/>
-              <a:t>AIRBYTE</a:t>
+              <a:t>DATA PIPELINE - AIRBYTE</a:t>
             </a:r>
           </a:p>
         </p:txBody>
@@ -9598,7 +9843,7 @@
           <a:p>
             <a:r>
               <a:rPr lang="fr-FR" dirty="0"/>
-              <a:t>KAFKA</a:t>
+              <a:t>DATA PIPELINE - KAFKA</a:t>
             </a:r>
           </a:p>
         </p:txBody>

</xml_diff>

<commit_message>
Je viens de rouvrir le dossier...
</commit_message>
<xml_diff>
--- a/99_assets/course_review_lead.pptx
+++ b/99_assets/course_review_lead.pptx
@@ -131,6 +131,75 @@
 <file path=ppt/changesInfos/changesInfo1.xml><?xml version="1.0" encoding="utf-8"?>
 <pc:chgInfo xmlns:a="http://schemas.openxmlformats.org/drawingml/2006/main" xmlns:r="http://schemas.openxmlformats.org/officeDocument/2006/relationships" xmlns:ac="http://schemas.microsoft.com/office/drawing/2013/main/command" xmlns:pc="http://schemas.microsoft.com/office/powerpoint/2013/main/command">
   <pc:docChgLst>
+    <pc:chgData name="Philippe Baucour" userId="5102170ae7533958" providerId="LiveId" clId="{5806EB48-A84D-4CE1-9430-6D6A79D3E337}"/>
+    <pc:docChg chg="custSel modSld">
+      <pc:chgData name="Philippe Baucour" userId="5102170ae7533958" providerId="LiveId" clId="{5806EB48-A84D-4CE1-9430-6D6A79D3E337}" dt="2024-10-20T09:38:37.076" v="60" actId="6549"/>
+      <pc:docMkLst>
+        <pc:docMk/>
+      </pc:docMkLst>
+      <pc:sldChg chg="modSp mod">
+        <pc:chgData name="Philippe Baucour" userId="5102170ae7533958" providerId="LiveId" clId="{5806EB48-A84D-4CE1-9430-6D6A79D3E337}" dt="2024-10-20T09:37:43.362" v="32" actId="20577"/>
+        <pc:sldMkLst>
+          <pc:docMk/>
+          <pc:sldMk cId="771183398" sldId="304"/>
+        </pc:sldMkLst>
+        <pc:spChg chg="mod">
+          <ac:chgData name="Philippe Baucour" userId="5102170ae7533958" providerId="LiveId" clId="{5806EB48-A84D-4CE1-9430-6D6A79D3E337}" dt="2024-10-20T09:37:43.362" v="32" actId="20577"/>
+          <ac:spMkLst>
+            <pc:docMk/>
+            <pc:sldMk cId="771183398" sldId="304"/>
+            <ac:spMk id="2" creationId="{D276AEF9-7CB4-DBF9-7004-121C3F76A9A1}"/>
+          </ac:spMkLst>
+        </pc:spChg>
+      </pc:sldChg>
+      <pc:sldChg chg="modSp mod">
+        <pc:chgData name="Philippe Baucour" userId="5102170ae7533958" providerId="LiveId" clId="{5806EB48-A84D-4CE1-9430-6D6A79D3E337}" dt="2024-10-20T09:37:58.944" v="44" actId="6549"/>
+        <pc:sldMkLst>
+          <pc:docMk/>
+          <pc:sldMk cId="2969746590" sldId="307"/>
+        </pc:sldMkLst>
+        <pc:spChg chg="mod">
+          <ac:chgData name="Philippe Baucour" userId="5102170ae7533958" providerId="LiveId" clId="{5806EB48-A84D-4CE1-9430-6D6A79D3E337}" dt="2024-10-20T09:37:58.944" v="44" actId="6549"/>
+          <ac:spMkLst>
+            <pc:docMk/>
+            <pc:sldMk cId="2969746590" sldId="307"/>
+            <ac:spMk id="2" creationId="{C1B6D8F8-9417-E8BB-4C0C-20F495209F6E}"/>
+          </ac:spMkLst>
+        </pc:spChg>
+      </pc:sldChg>
+      <pc:sldChg chg="modSp mod">
+        <pc:chgData name="Philippe Baucour" userId="5102170ae7533958" providerId="LiveId" clId="{5806EB48-A84D-4CE1-9430-6D6A79D3E337}" dt="2024-10-20T09:38:07.977" v="52" actId="6549"/>
+        <pc:sldMkLst>
+          <pc:docMk/>
+          <pc:sldMk cId="1431826525" sldId="308"/>
+        </pc:sldMkLst>
+        <pc:spChg chg="mod">
+          <ac:chgData name="Philippe Baucour" userId="5102170ae7533958" providerId="LiveId" clId="{5806EB48-A84D-4CE1-9430-6D6A79D3E337}" dt="2024-10-20T09:38:07.977" v="52" actId="6549"/>
+          <ac:spMkLst>
+            <pc:docMk/>
+            <pc:sldMk cId="1431826525" sldId="308"/>
+            <ac:spMk id="2" creationId="{D5199EB7-41C4-D2EB-9D79-85C93A241BD6}"/>
+          </ac:spMkLst>
+        </pc:spChg>
+      </pc:sldChg>
+      <pc:sldChg chg="modSp mod">
+        <pc:chgData name="Philippe Baucour" userId="5102170ae7533958" providerId="LiveId" clId="{5806EB48-A84D-4CE1-9430-6D6A79D3E337}" dt="2024-10-20T09:38:37.076" v="60" actId="6549"/>
+        <pc:sldMkLst>
+          <pc:docMk/>
+          <pc:sldMk cId="3873636325" sldId="309"/>
+        </pc:sldMkLst>
+        <pc:spChg chg="mod">
+          <ac:chgData name="Philippe Baucour" userId="5102170ae7533958" providerId="LiveId" clId="{5806EB48-A84D-4CE1-9430-6D6A79D3E337}" dt="2024-10-20T09:38:37.076" v="60" actId="6549"/>
+          <ac:spMkLst>
+            <pc:docMk/>
+            <pc:sldMk cId="3873636325" sldId="309"/>
+            <ac:spMk id="2" creationId="{78B511FD-690B-7F4D-72CE-17E648F3C616}"/>
+          </ac:spMkLst>
+        </pc:spChg>
+      </pc:sldChg>
+    </pc:docChg>
+  </pc:docChgLst>
+  <pc:docChgLst>
     <pc:chgData name="Philippe Baucour" userId="5102170ae7533958" providerId="LiveId" clId="{952C97B6-A072-4483-877C-DF77E4F5521D}"/>
     <pc:docChg chg="undo custSel addSld delSld modSld sldOrd">
       <pc:chgData name="Philippe Baucour" userId="5102170ae7533958" providerId="LiveId" clId="{952C97B6-A072-4483-877C-DF77E4F5521D}" dt="2024-06-01T15:18:04.257" v="3696" actId="47"/>
@@ -5226,7 +5295,7 @@
           <a:p>
             <a:fld id="{C5D8FFE9-C585-481A-8C95-EA03CD59938B}" type="datetimeFigureOut">
               <a:rPr lang="fr-FR" smtClean="0"/>
-              <a:t>31/07/2024</a:t>
+              <a:t>20/10/2024</a:t>
             </a:fld>
             <a:endParaRPr lang="fr-FR"/>
           </a:p>
@@ -5640,7 +5709,7 @@
           <a:p>
             <a:fld id="{E049BE60-F297-4D51-9BF6-34EA6E4A2150}" type="datetimeFigureOut">
               <a:rPr lang="fr-FR" smtClean="0"/>
-              <a:t>31/07/2024</a:t>
+              <a:t>20/10/2024</a:t>
             </a:fld>
             <a:endParaRPr lang="fr-FR"/>
           </a:p>
@@ -5838,7 +5907,7 @@
           <a:p>
             <a:fld id="{E049BE60-F297-4D51-9BF6-34EA6E4A2150}" type="datetimeFigureOut">
               <a:rPr lang="fr-FR" smtClean="0"/>
-              <a:t>31/07/2024</a:t>
+              <a:t>20/10/2024</a:t>
             </a:fld>
             <a:endParaRPr lang="fr-FR"/>
           </a:p>
@@ -6046,7 +6115,7 @@
           <a:p>
             <a:fld id="{E049BE60-F297-4D51-9BF6-34EA6E4A2150}" type="datetimeFigureOut">
               <a:rPr lang="fr-FR" smtClean="0"/>
-              <a:t>31/07/2024</a:t>
+              <a:t>20/10/2024</a:t>
             </a:fld>
             <a:endParaRPr lang="fr-FR"/>
           </a:p>
@@ -6244,7 +6313,7 @@
           <a:p>
             <a:fld id="{E049BE60-F297-4D51-9BF6-34EA6E4A2150}" type="datetimeFigureOut">
               <a:rPr lang="fr-FR" smtClean="0"/>
-              <a:t>31/07/2024</a:t>
+              <a:t>20/10/2024</a:t>
             </a:fld>
             <a:endParaRPr lang="fr-FR"/>
           </a:p>
@@ -6519,7 +6588,7 @@
           <a:p>
             <a:fld id="{E049BE60-F297-4D51-9BF6-34EA6E4A2150}" type="datetimeFigureOut">
               <a:rPr lang="fr-FR" smtClean="0"/>
-              <a:t>31/07/2024</a:t>
+              <a:t>20/10/2024</a:t>
             </a:fld>
             <a:endParaRPr lang="fr-FR"/>
           </a:p>
@@ -6784,7 +6853,7 @@
           <a:p>
             <a:fld id="{E049BE60-F297-4D51-9BF6-34EA6E4A2150}" type="datetimeFigureOut">
               <a:rPr lang="fr-FR" smtClean="0"/>
-              <a:t>31/07/2024</a:t>
+              <a:t>20/10/2024</a:t>
             </a:fld>
             <a:endParaRPr lang="fr-FR"/>
           </a:p>
@@ -7196,7 +7265,7 @@
           <a:p>
             <a:fld id="{E049BE60-F297-4D51-9BF6-34EA6E4A2150}" type="datetimeFigureOut">
               <a:rPr lang="fr-FR" smtClean="0"/>
-              <a:t>31/07/2024</a:t>
+              <a:t>20/10/2024</a:t>
             </a:fld>
             <a:endParaRPr lang="fr-FR"/>
           </a:p>
@@ -7337,7 +7406,7 @@
           <a:p>
             <a:fld id="{E049BE60-F297-4D51-9BF6-34EA6E4A2150}" type="datetimeFigureOut">
               <a:rPr lang="fr-FR" smtClean="0"/>
-              <a:t>31/07/2024</a:t>
+              <a:t>20/10/2024</a:t>
             </a:fld>
             <a:endParaRPr lang="fr-FR"/>
           </a:p>
@@ -7450,7 +7519,7 @@
           <a:p>
             <a:fld id="{E049BE60-F297-4D51-9BF6-34EA6E4A2150}" type="datetimeFigureOut">
               <a:rPr lang="fr-FR" smtClean="0"/>
-              <a:t>31/07/2024</a:t>
+              <a:t>20/10/2024</a:t>
             </a:fld>
             <a:endParaRPr lang="fr-FR"/>
           </a:p>
@@ -7761,7 +7830,7 @@
           <a:p>
             <a:fld id="{E049BE60-F297-4D51-9BF6-34EA6E4A2150}" type="datetimeFigureOut">
               <a:rPr lang="fr-FR" smtClean="0"/>
-              <a:t>31/07/2024</a:t>
+              <a:t>20/10/2024</a:t>
             </a:fld>
             <a:endParaRPr lang="fr-FR"/>
           </a:p>
@@ -8052,7 +8121,7 @@
           <a:p>
             <a:fld id="{E049BE60-F297-4D51-9BF6-34EA6E4A2150}" type="datetimeFigureOut">
               <a:rPr lang="fr-FR" smtClean="0"/>
-              <a:t>31/07/2024</a:t>
+              <a:t>20/10/2024</a:t>
             </a:fld>
             <a:endParaRPr lang="fr-FR"/>
           </a:p>
@@ -8293,7 +8362,7 @@
           <a:p>
             <a:fld id="{E049BE60-F297-4D51-9BF6-34EA6E4A2150}" type="datetimeFigureOut">
               <a:rPr lang="fr-FR" smtClean="0"/>
-              <a:t>31/07/2024</a:t>
+              <a:t>20/10/2024</a:t>
             </a:fld>
             <a:endParaRPr lang="fr-FR"/>
           </a:p>
@@ -8816,7 +8885,7 @@
           <a:p>
             <a:r>
               <a:rPr lang="fr-FR" dirty="0"/>
-              <a:t>DATA PIPELINE - NEO4J</a:t>
+              <a:t>DATA PIPELINE – NEO4J</a:t>
             </a:r>
           </a:p>
         </p:txBody>
@@ -9481,12 +9550,8 @@
           <a:lstStyle/>
           <a:p>
             <a:r>
-              <a:rPr lang="fr-FR"/>
-              <a:t>Distributed ML – DL &amp; Ray </a:t>
-            </a:r>
-            <a:r>
               <a:rPr lang="fr-FR" dirty="0"/>
-              <a:t>Cluster</a:t>
+              <a:t>Distributed ML – DL &amp; RAY Cluster</a:t>
             </a:r>
           </a:p>
         </p:txBody>

</xml_diff>